<commit_message>
actualizadas diapositivas de redes
</commit_message>
<xml_diff>
--- a/documentacion/analisis_de_redes.pptx
+++ b/documentacion/analisis_de_redes.pptx
@@ -5,17 +5,19 @@
     <p:sldMasterId id="2147483648" r:id="rId1"/>
   </p:sldMasterIdLst>
   <p:notesMasterIdLst>
-    <p:notesMasterId r:id="rId7"/>
+    <p:notesMasterId r:id="rId9"/>
   </p:notesMasterIdLst>
   <p:handoutMasterIdLst>
-    <p:handoutMasterId r:id="rId8"/>
+    <p:handoutMasterId r:id="rId10"/>
   </p:handoutMasterIdLst>
   <p:sldIdLst>
     <p:sldId id="256" r:id="rId2"/>
     <p:sldId id="267" r:id="rId3"/>
     <p:sldId id="261" r:id="rId4"/>
-    <p:sldId id="274" r:id="rId5"/>
-    <p:sldId id="275" r:id="rId6"/>
+    <p:sldId id="276" r:id="rId5"/>
+    <p:sldId id="274" r:id="rId6"/>
+    <p:sldId id="277" r:id="rId7"/>
+    <p:sldId id="275" r:id="rId8"/>
   </p:sldIdLst>
   <p:sldSz cx="12188825" cy="6858000"/>
   <p:notesSz cx="6858000" cy="9144000"/>
@@ -236,7 +238,7 @@
             <a:pPr rtl="0"/>
             <a:fld id="{69BBBD98-8689-4A62-BBFB-92BF328A7966}" type="datetime1">
               <a:rPr lang="es-ES" smtClean="0"/>
-              <a:t>11/11/2018</a:t>
+              <a:t>14/11/2018</a:t>
             </a:fld>
             <a:endParaRPr lang="es-ES" dirty="0"/>
           </a:p>
@@ -414,7 +416,7 @@
             <a:pPr rtl="0"/>
             <a:fld id="{8E41AB9B-16BF-4ECF-B92C-3E61E5BECA90}" type="datetime1">
               <a:rPr lang="es-ES" noProof="0" smtClean="0"/>
-              <a:t>11/11/2018</a:t>
+              <a:t>14/11/2018</a:t>
             </a:fld>
             <a:endParaRPr lang="es-ES" noProof="0" dirty="0"/>
           </a:p>
@@ -1028,7 +1030,7 @@
     </p:spTree>
     <p:extLst>
       <p:ext uri="{BB962C8B-B14F-4D97-AF65-F5344CB8AC3E}">
-        <p14:creationId xmlns:p14="http://schemas.microsoft.com/office/powerpoint/2010/main" val="3482572838"/>
+        <p14:creationId xmlns:p14="http://schemas.microsoft.com/office/powerpoint/2010/main" val="4221201379"/>
       </p:ext>
     </p:extLst>
   </p:cSld>
@@ -1106,6 +1108,178 @@
               <a:rPr lang="es-ES" smtClean="0"/>
               <a:pPr rtl="0"/>
               <a:t>5</a:t>
+            </a:fld>
+            <a:endParaRPr lang="es-ES" dirty="0"/>
+          </a:p>
+        </p:txBody>
+      </p:sp>
+    </p:spTree>
+    <p:extLst>
+      <p:ext uri="{BB962C8B-B14F-4D97-AF65-F5344CB8AC3E}">
+        <p14:creationId xmlns:p14="http://schemas.microsoft.com/office/powerpoint/2010/main" val="3482572838"/>
+      </p:ext>
+    </p:extLst>
+  </p:cSld>
+  <p:clrMapOvr>
+    <a:masterClrMapping/>
+  </p:clrMapOvr>
+</p:notes>
+</file>
+
+<file path=ppt/notesSlides/notesSlide6.xml><?xml version="1.0" encoding="utf-8"?>
+<p:notes xmlns:a="http://schemas.openxmlformats.org/drawingml/2006/main" xmlns:r="http://schemas.openxmlformats.org/officeDocument/2006/relationships" xmlns:p="http://schemas.openxmlformats.org/presentationml/2006/main">
+  <p:cSld>
+    <p:spTree>
+      <p:nvGrpSpPr>
+        <p:cNvPr id="1" name=""/>
+        <p:cNvGrpSpPr/>
+        <p:nvPr/>
+      </p:nvGrpSpPr>
+      <p:grpSpPr>
+        <a:xfrm>
+          <a:off x="0" y="0"/>
+          <a:ext cx="0" cy="0"/>
+          <a:chOff x="0" y="0"/>
+          <a:chExt cx="0" cy="0"/>
+        </a:xfrm>
+      </p:grpSpPr>
+      <p:sp>
+        <p:nvSpPr>
+          <p:cNvPr id="2" name="Marcador de imagen de diapositiva 1"/>
+          <p:cNvSpPr>
+            <a:spLocks noGrp="1" noRot="1" noChangeAspect="1"/>
+          </p:cNvSpPr>
+          <p:nvPr>
+            <p:ph type="sldImg"/>
+          </p:nvPr>
+        </p:nvSpPr>
+        <p:spPr/>
+      </p:sp>
+      <p:sp>
+        <p:nvSpPr>
+          <p:cNvPr id="3" name="Marcador de notas 2"/>
+          <p:cNvSpPr>
+            <a:spLocks noGrp="1"/>
+          </p:cNvSpPr>
+          <p:nvPr>
+            <p:ph type="body" idx="1"/>
+          </p:nvPr>
+        </p:nvSpPr>
+        <p:spPr/>
+        <p:txBody>
+          <a:bodyPr/>
+          <a:lstStyle/>
+          <a:p>
+            <a:endParaRPr lang="es-ES" dirty="0"/>
+          </a:p>
+        </p:txBody>
+      </p:sp>
+      <p:sp>
+        <p:nvSpPr>
+          <p:cNvPr id="4" name="Marcador de número de diapositiva 3"/>
+          <p:cNvSpPr>
+            <a:spLocks noGrp="1"/>
+          </p:cNvSpPr>
+          <p:nvPr>
+            <p:ph type="sldNum" sz="quarter" idx="10"/>
+          </p:nvPr>
+        </p:nvSpPr>
+        <p:spPr/>
+        <p:txBody>
+          <a:bodyPr/>
+          <a:lstStyle/>
+          <a:p>
+            <a:pPr rtl="0"/>
+            <a:fld id="{841221E5-7225-48EB-A4EE-420E7BFCF705}" type="slidenum">
+              <a:rPr lang="es-ES" smtClean="0"/>
+              <a:pPr rtl="0"/>
+              <a:t>6</a:t>
+            </a:fld>
+            <a:endParaRPr lang="es-ES" dirty="0"/>
+          </a:p>
+        </p:txBody>
+      </p:sp>
+    </p:spTree>
+    <p:extLst>
+      <p:ext uri="{BB962C8B-B14F-4D97-AF65-F5344CB8AC3E}">
+        <p14:creationId xmlns:p14="http://schemas.microsoft.com/office/powerpoint/2010/main" val="1936761027"/>
+      </p:ext>
+    </p:extLst>
+  </p:cSld>
+  <p:clrMapOvr>
+    <a:masterClrMapping/>
+  </p:clrMapOvr>
+</p:notes>
+</file>
+
+<file path=ppt/notesSlides/notesSlide7.xml><?xml version="1.0" encoding="utf-8"?>
+<p:notes xmlns:a="http://schemas.openxmlformats.org/drawingml/2006/main" xmlns:r="http://schemas.openxmlformats.org/officeDocument/2006/relationships" xmlns:p="http://schemas.openxmlformats.org/presentationml/2006/main">
+  <p:cSld>
+    <p:spTree>
+      <p:nvGrpSpPr>
+        <p:cNvPr id="1" name=""/>
+        <p:cNvGrpSpPr/>
+        <p:nvPr/>
+      </p:nvGrpSpPr>
+      <p:grpSpPr>
+        <a:xfrm>
+          <a:off x="0" y="0"/>
+          <a:ext cx="0" cy="0"/>
+          <a:chOff x="0" y="0"/>
+          <a:chExt cx="0" cy="0"/>
+        </a:xfrm>
+      </p:grpSpPr>
+      <p:sp>
+        <p:nvSpPr>
+          <p:cNvPr id="2" name="Marcador de imagen de diapositiva 1"/>
+          <p:cNvSpPr>
+            <a:spLocks noGrp="1" noRot="1" noChangeAspect="1"/>
+          </p:cNvSpPr>
+          <p:nvPr>
+            <p:ph type="sldImg"/>
+          </p:nvPr>
+        </p:nvSpPr>
+        <p:spPr/>
+      </p:sp>
+      <p:sp>
+        <p:nvSpPr>
+          <p:cNvPr id="3" name="Marcador de notas 2"/>
+          <p:cNvSpPr>
+            <a:spLocks noGrp="1"/>
+          </p:cNvSpPr>
+          <p:nvPr>
+            <p:ph type="body" idx="1"/>
+          </p:nvPr>
+        </p:nvSpPr>
+        <p:spPr/>
+        <p:txBody>
+          <a:bodyPr/>
+          <a:lstStyle/>
+          <a:p>
+            <a:endParaRPr lang="es-ES" dirty="0"/>
+          </a:p>
+        </p:txBody>
+      </p:sp>
+      <p:sp>
+        <p:nvSpPr>
+          <p:cNvPr id="4" name="Marcador de número de diapositiva 3"/>
+          <p:cNvSpPr>
+            <a:spLocks noGrp="1"/>
+          </p:cNvSpPr>
+          <p:nvPr>
+            <p:ph type="sldNum" sz="quarter" idx="10"/>
+          </p:nvPr>
+        </p:nvSpPr>
+        <p:spPr/>
+        <p:txBody>
+          <a:bodyPr/>
+          <a:lstStyle/>
+          <a:p>
+            <a:pPr rtl="0"/>
+            <a:fld id="{841221E5-7225-48EB-A4EE-420E7BFCF705}" type="slidenum">
+              <a:rPr lang="es-ES" smtClean="0"/>
+              <a:pPr rtl="0"/>
+              <a:t>7</a:t>
             </a:fld>
             <a:endParaRPr lang="es-ES" dirty="0"/>
           </a:p>
@@ -2044,7 +2218,7 @@
             <a:pPr rtl="0"/>
             <a:fld id="{466E6084-0988-49B4-BD4E-1264194D9864}" type="datetime1">
               <a:rPr lang="es-ES" noProof="0" smtClean="0"/>
-              <a:t>11/11/2018</a:t>
+              <a:t>14/11/2018</a:t>
             </a:fld>
             <a:endParaRPr lang="es-ES" noProof="0" dirty="0"/>
           </a:p>
@@ -2271,7 +2445,7 @@
             <a:pPr rtl="0"/>
             <a:fld id="{45EEB305-4E92-401E-9FCA-996DF9FD55B6}" type="datetime1">
               <a:rPr lang="es-ES" noProof="0" smtClean="0"/>
-              <a:t>11/11/2018</a:t>
+              <a:t>14/11/2018</a:t>
             </a:fld>
             <a:endParaRPr lang="es-ES" noProof="0" dirty="0"/>
           </a:p>
@@ -3094,7 +3268,7 @@
             <a:pPr rtl="0"/>
             <a:fld id="{67E901BA-1555-4CE1-92B2-39682A57B7CA}" type="datetime1">
               <a:rPr lang="es-ES" noProof="0" smtClean="0"/>
-              <a:t>11/11/2018</a:t>
+              <a:t>14/11/2018</a:t>
             </a:fld>
             <a:endParaRPr lang="es-ES" noProof="0" dirty="0"/>
           </a:p>
@@ -3299,7 +3473,7 @@
             <a:pPr rtl="0"/>
             <a:fld id="{8B94D32F-F0D9-47B3-AAC6-D43DC057831A}" type="datetime1">
               <a:rPr lang="es-ES" noProof="0" smtClean="0"/>
-              <a:t>11/11/2018</a:t>
+              <a:t>14/11/2018</a:t>
             </a:fld>
             <a:endParaRPr lang="es-ES" noProof="0" dirty="0"/>
           </a:p>
@@ -4569,7 +4743,7 @@
             <a:pPr rtl="0"/>
             <a:fld id="{BB07FB1B-461B-4D1D-952B-7FEEFF2CFA29}" type="datetime1">
               <a:rPr lang="es-ES" noProof="0" smtClean="0"/>
-              <a:t>11/11/2018</a:t>
+              <a:t>14/11/2018</a:t>
             </a:fld>
             <a:endParaRPr lang="es-ES" noProof="0" dirty="0"/>
           </a:p>
@@ -4898,7 +5072,7 @@
             <a:pPr rtl="0"/>
             <a:fld id="{6EC9D876-84BE-45D9-9418-9FF24663C364}" type="datetime1">
               <a:rPr lang="es-ES" noProof="0" smtClean="0"/>
-              <a:t>11/11/2018</a:t>
+              <a:t>14/11/2018</a:t>
             </a:fld>
             <a:endParaRPr lang="es-ES" noProof="0" dirty="0"/>
           </a:p>
@@ -5353,7 +5527,7 @@
             <a:pPr rtl="0"/>
             <a:fld id="{AACDF9AA-CFE1-4BA9-8C5D-54C264D423B8}" type="datetime1">
               <a:rPr lang="es-ES" noProof="0" smtClean="0"/>
-              <a:t>11/11/2018</a:t>
+              <a:t>14/11/2018</a:t>
             </a:fld>
             <a:endParaRPr lang="es-ES" noProof="0" dirty="0"/>
           </a:p>
@@ -5490,7 +5664,7 @@
             <a:pPr rtl="0"/>
             <a:fld id="{CDA51D7A-9E1F-4C6F-8B86-F39A8650CB7A}" type="datetime1">
               <a:rPr lang="es-ES" noProof="0" smtClean="0"/>
-              <a:t>11/11/2018</a:t>
+              <a:t>14/11/2018</a:t>
             </a:fld>
             <a:endParaRPr lang="es-ES" noProof="0" dirty="0"/>
           </a:p>
@@ -5831,7 +6005,7 @@
             <a:pPr rtl="0"/>
             <a:fld id="{66A1E9FB-24DE-4A64-B35D-DF3FF6E51288}" type="datetime1">
               <a:rPr lang="es-ES" noProof="0" smtClean="0"/>
-              <a:t>11/11/2018</a:t>
+              <a:t>14/11/2018</a:t>
             </a:fld>
             <a:endParaRPr lang="es-ES" noProof="0" dirty="0"/>
           </a:p>
@@ -6330,7 +6504,7 @@
             <a:pPr rtl="0"/>
             <a:fld id="{53CDA7DC-138B-4843-B77A-91873FF451A9}" type="datetime1">
               <a:rPr lang="es-ES" noProof="0" smtClean="0"/>
-              <a:t>11/11/2018</a:t>
+              <a:t>14/11/2018</a:t>
             </a:fld>
             <a:endParaRPr lang="es-ES" noProof="0" dirty="0"/>
           </a:p>
@@ -6786,7 +6960,7 @@
             <a:pPr rtl="0"/>
             <a:fld id="{CB016917-91ED-4B62-9DC6-0583229F954A}" type="datetime1">
               <a:rPr lang="es-ES" noProof="0" smtClean="0"/>
-              <a:t>11/11/2018</a:t>
+              <a:t>14/11/2018</a:t>
             </a:fld>
             <a:endParaRPr lang="es-ES" noProof="0" dirty="0"/>
           </a:p>
@@ -7690,7 +7864,7 @@
             <a:pPr rtl="0"/>
             <a:fld id="{75031EA3-1207-456F-B1A7-F20CDD0C2E7B}" type="datetime1">
               <a:rPr lang="es-ES" noProof="0" smtClean="0"/>
-              <a:t>11/11/2018</a:t>
+              <a:t>14/11/2018</a:t>
             </a:fld>
             <a:endParaRPr lang="es-ES" noProof="0" dirty="0"/>
           </a:p>
@@ -8189,7 +8363,7 @@
         <p:spPr>
           <a:xfrm>
             <a:off x="9550796" y="6093296"/>
-            <a:ext cx="1576201" cy="369332"/>
+            <a:ext cx="1460785" cy="369332"/>
           </a:xfrm>
           <a:prstGeom prst="rect">
             <a:avLst/>
@@ -8204,7 +8378,7 @@
           <a:p>
             <a:r>
               <a:rPr lang="es-ES" b="1" dirty="0"/>
-              <a:t>F. R. </a:t>
+              <a:t>F.R. </a:t>
             </a:r>
             <a:r>
               <a:rPr lang="es-ES" b="1" dirty="0" err="1"/>
@@ -8329,6 +8503,13 @@
             <a:r>
               <a:rPr lang="es-ES" sz="2400" dirty="0"/>
               <a:t>¿Tiene sentido tratar además con una taxonomía?</a:t>
+            </a:r>
+          </a:p>
+          <a:p>
+            <a:pPr rtl="0"/>
+            <a:r>
+              <a:rPr lang="es-ES" sz="2400" dirty="0"/>
+              <a:t>Se hace necesario pasar un filtro a la red debido a su tamaño.</a:t>
             </a:r>
           </a:p>
         </p:txBody>
@@ -8630,13 +8811,27 @@
           <a:p>
             <a:r>
               <a:rPr lang="es-ES" sz="1600" dirty="0"/>
+              <a:t>Serviría a priori tanto para </a:t>
+            </a:r>
+            <a:r>
+              <a:rPr lang="es-ES" sz="1600" dirty="0" err="1"/>
+              <a:t>Wikia</a:t>
+            </a:r>
+            <a:r>
+              <a:rPr lang="es-ES" sz="1600" dirty="0"/>
+              <a:t> como para Wikipedia</a:t>
+            </a:r>
+          </a:p>
+          <a:p>
+            <a:r>
+              <a:rPr lang="es-ES" sz="1600" dirty="0"/>
               <a:t>Muestra las relaciones directas entre usuarios</a:t>
             </a:r>
           </a:p>
           <a:p>
             <a:r>
               <a:rPr lang="es-ES" sz="1600" dirty="0"/>
-              <a:t>Poca complejidad</a:t>
+              <a:t>Poca complejidad (típica red)</a:t>
             </a:r>
           </a:p>
           <a:p>
@@ -8724,7 +8919,7 @@
             <a:pPr rtl="0"/>
             <a:r>
               <a:rPr lang="es-ES" sz="2800" dirty="0"/>
-              <a:t>Red 2. Enfatizar Contenido</a:t>
+              <a:t>Red 1. Enfatizar Usuarios</a:t>
             </a:r>
           </a:p>
         </p:txBody>
@@ -8924,71 +9119,64 @@
             <a:pPr marL="0" indent="0">
               <a:buNone/>
             </a:pPr>
-            <a:r>
-              <a:rPr lang="es-ES" sz="1600" b="1" dirty="0"/>
-              <a:t>Características:</a:t>
-            </a:r>
-          </a:p>
-          <a:p>
-            <a:r>
-              <a:rPr lang="es-ES" sz="1600" dirty="0"/>
-              <a:t>Nodos: los artículos</a:t>
-            </a:r>
-          </a:p>
-          <a:p>
-            <a:r>
-              <a:rPr lang="es-ES" sz="1600" dirty="0"/>
-              <a:t>Aristas: un usuario ha editado los dos artículos</a:t>
-            </a:r>
+            <a:endParaRPr lang="es-ES" sz="1600" b="1" dirty="0"/>
           </a:p>
           <a:p>
             <a:pPr marL="0" indent="0">
               <a:buNone/>
             </a:pPr>
-            <a:endParaRPr lang="es-ES" sz="1600" dirty="0"/>
+            <a:r>
+              <a:rPr lang="es-ES" sz="1600" b="1" dirty="0"/>
+              <a:t>Posible análisis:</a:t>
+            </a:r>
           </a:p>
           <a:p>
             <a:pPr marL="0" indent="0">
               <a:buNone/>
             </a:pPr>
-            <a:r>
-              <a:rPr lang="es-ES" sz="1600" b="1" dirty="0"/>
-              <a:t>Pros:</a:t>
-            </a:r>
+            <a:endParaRPr lang="es-ES" sz="1600" b="1" dirty="0"/>
           </a:p>
           <a:p>
             <a:r>
               <a:rPr lang="es-ES" sz="1600" dirty="0"/>
-              <a:t>Muestra las relaciones de usuarios, sobre diferentes artículos</a:t>
+              <a:t>Se pueden analizar clústeres que vayan apareciendo en una escala temporal, o de calidad</a:t>
             </a:r>
           </a:p>
           <a:p>
             <a:r>
               <a:rPr lang="es-ES" sz="1600" dirty="0"/>
-              <a:t>El tamaño es en base al número de artículos, el cual, no debería ser demasiado grande.</a:t>
+              <a:t>Además se puede analizar que nodos son los más importantes dentro de la red (centralidad)</a:t>
             </a:r>
           </a:p>
           <a:p>
             <a:r>
               <a:rPr lang="es-ES" sz="1600" dirty="0"/>
-              <a:t>Serviría tanto para </a:t>
+              <a:t>Incluso un análisis posterior podría indicarnos si nodos más importantes tienen roles definidos dentro de la red.</a:t>
+            </a:r>
+          </a:p>
+          <a:p>
+            <a:r>
+              <a:rPr lang="es-ES" sz="1600" dirty="0"/>
+              <a:t>También se puede otorgar roles concretos a los usuarios, </a:t>
             </a:r>
             <a:r>
               <a:rPr lang="es-ES" sz="1600" dirty="0" err="1"/>
-              <a:t>Wikia</a:t>
+              <a:t>e.g</a:t>
             </a:r>
             <a:r>
               <a:rPr lang="es-ES" sz="1600" dirty="0"/>
-              <a:t> como para Wikipedia (haciendo una selección de artículos de la misma categoría)</a:t>
-            </a:r>
-          </a:p>
-          <a:p>
-            <a:endParaRPr lang="es-ES" sz="1600" dirty="0"/>
-          </a:p>
-          <a:p>
-            <a:pPr marL="0" indent="0">
-              <a:buNone/>
-            </a:pPr>
+              <a:t>. el usuario x realiza en su mayoría ediciones de contenido luego le damos el rol de editor. Posteriormente ver si por ejemplos los roles coinciden con los clústeres previamente estudiados, </a:t>
+            </a:r>
+            <a:r>
+              <a:rPr lang="es-ES" sz="1600" dirty="0" err="1"/>
+              <a:t>e.g</a:t>
+            </a:r>
+            <a:r>
+              <a:rPr lang="es-ES" sz="1600" dirty="0"/>
+              <a:t>. los editores se juntan con los editores, o diferentes roles se agrupan en un mismo clúster.</a:t>
+            </a:r>
+          </a:p>
+          <a:p>
             <a:endParaRPr lang="es-ES" sz="1600" dirty="0"/>
           </a:p>
         </p:txBody>
@@ -8996,7 +9184,7 @@
     </p:spTree>
     <p:extLst>
       <p:ext uri="{BB962C8B-B14F-4D97-AF65-F5344CB8AC3E}">
-        <p14:creationId xmlns:p14="http://schemas.microsoft.com/office/powerpoint/2010/main" val="1372646080"/>
+        <p14:creationId xmlns:p14="http://schemas.microsoft.com/office/powerpoint/2010/main" val="3740572716"/>
       </p:ext>
     </p:extLst>
   </p:cSld>
@@ -9055,7 +9243,7 @@
             <a:pPr rtl="0"/>
             <a:r>
               <a:rPr lang="es-ES" sz="2800" dirty="0"/>
-              <a:t>Red 3. Con Taxonomía</a:t>
+              <a:t>Red 2. Enfatizar Contenido</a:t>
             </a:r>
           </a:p>
         </p:txBody>
@@ -9263,36 +9451,19 @@
           <a:p>
             <a:r>
               <a:rPr lang="es-ES" sz="1600" dirty="0"/>
-              <a:t>Nodos: tuplas usuario, tipo de edición</a:t>
+              <a:t>Nodos: los artículos</a:t>
             </a:r>
           </a:p>
           <a:p>
             <a:r>
               <a:rPr lang="es-ES" sz="1600" dirty="0"/>
-              <a:t>Aristas: dos usuarios han editado el mismo artículo, y el tipo de edición pertenece al mismo grupo (superficie, contenido, políticas de Wikipedia).</a:t>
+              <a:t>Aristas: un usuario ha editado los dos artículos</a:t>
             </a:r>
           </a:p>
           <a:p>
             <a:pPr marL="0" indent="0">
               <a:buNone/>
             </a:pPr>
-            <a:r>
-              <a:rPr lang="es-ES" sz="1600" b="1" dirty="0"/>
-              <a:t>Pros:</a:t>
-            </a:r>
-          </a:p>
-          <a:p>
-            <a:r>
-              <a:rPr lang="es-ES" sz="1600" dirty="0"/>
-              <a:t>Añade información de las ediciones a </a:t>
-            </a:r>
-            <a:r>
-              <a:rPr lang="es-ES" sz="1600"/>
-              <a:t>la red</a:t>
-            </a:r>
-            <a:endParaRPr lang="es-ES" sz="1600" dirty="0"/>
-          </a:p>
-          <a:p>
             <a:endParaRPr lang="es-ES" sz="1600" dirty="0"/>
           </a:p>
           <a:p>
@@ -9301,6 +9472,675 @@
             </a:pPr>
             <a:r>
               <a:rPr lang="es-ES" sz="1600" b="1" dirty="0"/>
+              <a:t>Pros:</a:t>
+            </a:r>
+          </a:p>
+          <a:p>
+            <a:r>
+              <a:rPr lang="es-ES" sz="1600" dirty="0"/>
+              <a:t>Muestra como los artículos se relacionan por los usuarios que los editan.</a:t>
+            </a:r>
+          </a:p>
+          <a:p>
+            <a:r>
+              <a:rPr lang="es-ES" sz="1600" dirty="0"/>
+              <a:t>El tamaño es en base al número de artículos, el cual, no debería ser demasiado grande.</a:t>
+            </a:r>
+          </a:p>
+          <a:p>
+            <a:r>
+              <a:rPr lang="es-ES" sz="1600" dirty="0"/>
+              <a:t>Serviría tanto para </a:t>
+            </a:r>
+            <a:r>
+              <a:rPr lang="es-ES" sz="1600" dirty="0" err="1"/>
+              <a:t>Wikia</a:t>
+            </a:r>
+            <a:r>
+              <a:rPr lang="es-ES" sz="1600" dirty="0"/>
+              <a:t> como para Wikipedia (haciendo una selección de artículos de la misma categoría)</a:t>
+            </a:r>
+          </a:p>
+          <a:p>
+            <a:endParaRPr lang="es-ES" sz="1600" dirty="0"/>
+          </a:p>
+          <a:p>
+            <a:pPr marL="0" indent="0">
+              <a:buNone/>
+            </a:pPr>
+            <a:endParaRPr lang="es-ES" sz="1600" dirty="0"/>
+          </a:p>
+        </p:txBody>
+      </p:sp>
+    </p:spTree>
+    <p:extLst>
+      <p:ext uri="{BB962C8B-B14F-4D97-AF65-F5344CB8AC3E}">
+        <p14:creationId xmlns:p14="http://schemas.microsoft.com/office/powerpoint/2010/main" val="1372646080"/>
+      </p:ext>
+    </p:extLst>
+  </p:cSld>
+  <p:clrMapOvr>
+    <a:masterClrMapping/>
+  </p:clrMapOvr>
+  <mc:AlternateContent xmlns:mc="http://schemas.openxmlformats.org/markup-compatibility/2006" xmlns:p14="http://schemas.microsoft.com/office/powerpoint/2010/main">
+    <mc:Choice Requires="p14">
+      <p:transition spd="med" p14:dur="700">
+        <p:fade/>
+      </p:transition>
+    </mc:Choice>
+    <mc:Fallback xmlns="">
+      <p:transition spd="med">
+        <p:fade/>
+      </p:transition>
+    </mc:Fallback>
+  </mc:AlternateContent>
+</p:sld>
+</file>
+
+<file path=ppt/slides/slide6.xml><?xml version="1.0" encoding="utf-8"?>
+<p:sld xmlns:a="http://schemas.openxmlformats.org/drawingml/2006/main" xmlns:r="http://schemas.openxmlformats.org/officeDocument/2006/relationships" xmlns:p="http://schemas.openxmlformats.org/presentationml/2006/main">
+  <p:cSld>
+    <p:spTree>
+      <p:nvGrpSpPr>
+        <p:cNvPr id="1" name=""/>
+        <p:cNvGrpSpPr/>
+        <p:nvPr/>
+      </p:nvGrpSpPr>
+      <p:grpSpPr>
+        <a:xfrm>
+          <a:off x="0" y="0"/>
+          <a:ext cx="0" cy="0"/>
+          <a:chOff x="0" y="0"/>
+          <a:chExt cx="0" cy="0"/>
+        </a:xfrm>
+      </p:grpSpPr>
+      <p:sp>
+        <p:nvSpPr>
+          <p:cNvPr id="2" name="Título 1"/>
+          <p:cNvSpPr>
+            <a:spLocks noGrp="1"/>
+          </p:cNvSpPr>
+          <p:nvPr>
+            <p:ph type="title"/>
+          </p:nvPr>
+        </p:nvSpPr>
+        <p:spPr/>
+        <p:txBody>
+          <a:bodyPr rtlCol="0">
+            <a:normAutofit/>
+          </a:bodyPr>
+          <a:lstStyle/>
+          <a:p>
+            <a:pPr rtl="0"/>
+            <a:r>
+              <a:rPr lang="es-ES" sz="2800" dirty="0"/>
+              <a:t>Red 2. Enfatizar Contenido</a:t>
+            </a:r>
+          </a:p>
+        </p:txBody>
+      </p:sp>
+      <p:sp>
+        <p:nvSpPr>
+          <p:cNvPr id="3" name="Marcador de posición de contenido 13">
+            <a:extLst>
+              <a:ext uri="{FF2B5EF4-FFF2-40B4-BE49-F238E27FC236}">
+                <a16:creationId xmlns:a16="http://schemas.microsoft.com/office/drawing/2014/main" id="{36C76092-4EB3-4A65-97D3-371E9ABA090D}"/>
+              </a:ext>
+            </a:extLst>
+          </p:cNvPr>
+          <p:cNvSpPr txBox="1">
+            <a:spLocks/>
+          </p:cNvSpPr>
+          <p:nvPr/>
+        </p:nvSpPr>
+        <p:spPr>
+          <a:xfrm>
+            <a:off x="1593436" y="1600200"/>
+            <a:ext cx="9782801" cy="4572000"/>
+          </a:xfrm>
+          <a:prstGeom prst="rect">
+            <a:avLst/>
+          </a:prstGeom>
+        </p:spPr>
+        <p:txBody>
+          <a:bodyPr rtlCol="0">
+            <a:normAutofit/>
+          </a:bodyPr>
+          <a:lstStyle>
+            <a:lvl1pPr marL="246888" indent="-246888" algn="l" defTabSz="914400" rtl="0" eaLnBrk="1" latinLnBrk="0" hangingPunct="1">
+              <a:lnSpc>
+                <a:spcPct val="90000"/>
+              </a:lnSpc>
+              <a:spcBef>
+                <a:spcPts val="1400"/>
+              </a:spcBef>
+              <a:buFont typeface="Euphemia" pitchFamily="34" charset="0"/>
+              <a:buChar char="›"/>
+              <a:defRPr sz="2800" kern="1200">
+                <a:solidFill>
+                  <a:schemeClr val="tx1"/>
+                </a:solidFill>
+                <a:latin typeface="+mn-lt"/>
+                <a:ea typeface="+mn-ea"/>
+                <a:cs typeface="+mn-cs"/>
+              </a:defRPr>
+            </a:lvl1pPr>
+            <a:lvl2pPr marL="612648" indent="-246888" algn="l" defTabSz="914400" rtl="0" eaLnBrk="1" latinLnBrk="0" hangingPunct="1">
+              <a:lnSpc>
+                <a:spcPct val="90000"/>
+              </a:lnSpc>
+              <a:spcBef>
+                <a:spcPts val="600"/>
+              </a:spcBef>
+              <a:buFont typeface="Euphemia" pitchFamily="34" charset="0"/>
+              <a:buChar char="–"/>
+              <a:defRPr sz="2400" kern="1200">
+                <a:solidFill>
+                  <a:schemeClr val="tx1"/>
+                </a:solidFill>
+                <a:latin typeface="+mn-lt"/>
+                <a:ea typeface="+mn-ea"/>
+                <a:cs typeface="+mn-cs"/>
+              </a:defRPr>
+            </a:lvl2pPr>
+            <a:lvl3pPr marL="978408" indent="-246888" algn="l" defTabSz="914400" rtl="0" eaLnBrk="1" latinLnBrk="0" hangingPunct="1">
+              <a:lnSpc>
+                <a:spcPct val="90000"/>
+              </a:lnSpc>
+              <a:spcBef>
+                <a:spcPts val="600"/>
+              </a:spcBef>
+              <a:buFont typeface="Euphemia" pitchFamily="34" charset="0"/>
+              <a:buChar char="›"/>
+              <a:defRPr sz="2000" kern="1200">
+                <a:solidFill>
+                  <a:schemeClr val="tx1"/>
+                </a:solidFill>
+                <a:latin typeface="+mn-lt"/>
+                <a:ea typeface="+mn-ea"/>
+                <a:cs typeface="+mn-cs"/>
+              </a:defRPr>
+            </a:lvl3pPr>
+            <a:lvl4pPr marL="1344168" indent="-246888" algn="l" defTabSz="914400" rtl="0" eaLnBrk="1" latinLnBrk="0" hangingPunct="1">
+              <a:lnSpc>
+                <a:spcPct val="90000"/>
+              </a:lnSpc>
+              <a:spcBef>
+                <a:spcPts val="600"/>
+              </a:spcBef>
+              <a:buFont typeface="Arial" pitchFamily="34" charset="0"/>
+              <a:buChar char="–"/>
+              <a:defRPr sz="1800" kern="1200">
+                <a:solidFill>
+                  <a:schemeClr val="tx1"/>
+                </a:solidFill>
+                <a:latin typeface="+mn-lt"/>
+                <a:ea typeface="+mn-ea"/>
+                <a:cs typeface="+mn-cs"/>
+              </a:defRPr>
+            </a:lvl4pPr>
+            <a:lvl5pPr marL="1709928" indent="-246888" algn="l" defTabSz="914400" rtl="0" eaLnBrk="1" latinLnBrk="0" hangingPunct="1">
+              <a:lnSpc>
+                <a:spcPct val="90000"/>
+              </a:lnSpc>
+              <a:spcBef>
+                <a:spcPts val="600"/>
+              </a:spcBef>
+              <a:buFont typeface="Euphemia" pitchFamily="34" charset="0"/>
+              <a:buChar char="›"/>
+              <a:defRPr sz="1800" kern="1200">
+                <a:solidFill>
+                  <a:schemeClr val="tx1"/>
+                </a:solidFill>
+                <a:latin typeface="+mn-lt"/>
+                <a:ea typeface="+mn-ea"/>
+                <a:cs typeface="+mn-cs"/>
+              </a:defRPr>
+            </a:lvl5pPr>
+            <a:lvl6pPr marL="2075688" indent="-246888" algn="l" defTabSz="914400" rtl="0" eaLnBrk="1" latinLnBrk="0" hangingPunct="1">
+              <a:lnSpc>
+                <a:spcPct val="90000"/>
+              </a:lnSpc>
+              <a:spcBef>
+                <a:spcPts val="600"/>
+              </a:spcBef>
+              <a:buFont typeface="Euphemia" pitchFamily="34" charset="0"/>
+              <a:buChar char="–"/>
+              <a:defRPr sz="1800" kern="1200">
+                <a:solidFill>
+                  <a:schemeClr val="tx1"/>
+                </a:solidFill>
+                <a:latin typeface="+mn-lt"/>
+                <a:ea typeface="+mn-ea"/>
+                <a:cs typeface="+mn-cs"/>
+              </a:defRPr>
+            </a:lvl6pPr>
+            <a:lvl7pPr marL="2441448" indent="-246888" algn="l" defTabSz="914400" rtl="0" eaLnBrk="1" latinLnBrk="0" hangingPunct="1">
+              <a:lnSpc>
+                <a:spcPct val="90000"/>
+              </a:lnSpc>
+              <a:spcBef>
+                <a:spcPts val="600"/>
+              </a:spcBef>
+              <a:buFont typeface="Euphemia" pitchFamily="34" charset="0"/>
+              <a:buChar char="›"/>
+              <a:defRPr sz="1800" kern="1200">
+                <a:solidFill>
+                  <a:schemeClr val="tx1"/>
+                </a:solidFill>
+                <a:latin typeface="+mn-lt"/>
+                <a:ea typeface="+mn-ea"/>
+                <a:cs typeface="+mn-cs"/>
+              </a:defRPr>
+            </a:lvl7pPr>
+            <a:lvl8pPr marL="2807208" indent="-246888" algn="l" defTabSz="914400" rtl="0" eaLnBrk="1" latinLnBrk="0" hangingPunct="1">
+              <a:lnSpc>
+                <a:spcPct val="90000"/>
+              </a:lnSpc>
+              <a:spcBef>
+                <a:spcPts val="600"/>
+              </a:spcBef>
+              <a:buFont typeface="Euphemia" pitchFamily="34" charset="0"/>
+              <a:buChar char="–"/>
+              <a:defRPr sz="1800" kern="1200" baseline="0">
+                <a:solidFill>
+                  <a:schemeClr val="tx1"/>
+                </a:solidFill>
+                <a:latin typeface="+mn-lt"/>
+                <a:ea typeface="+mn-ea"/>
+                <a:cs typeface="+mn-cs"/>
+              </a:defRPr>
+            </a:lvl8pPr>
+            <a:lvl9pPr marL="3172968" indent="-246888" algn="l" defTabSz="914400" rtl="0" eaLnBrk="1" latinLnBrk="0" hangingPunct="1">
+              <a:lnSpc>
+                <a:spcPct val="90000"/>
+              </a:lnSpc>
+              <a:spcBef>
+                <a:spcPts val="600"/>
+              </a:spcBef>
+              <a:buFont typeface="Euphemia" pitchFamily="34" charset="0"/>
+              <a:buChar char="›"/>
+              <a:defRPr sz="1800" kern="1200" baseline="0">
+                <a:solidFill>
+                  <a:schemeClr val="tx1"/>
+                </a:solidFill>
+                <a:latin typeface="+mn-lt"/>
+                <a:ea typeface="+mn-ea"/>
+                <a:cs typeface="+mn-cs"/>
+              </a:defRPr>
+            </a:lvl9pPr>
+          </a:lstStyle>
+          <a:p>
+            <a:pPr marL="0" indent="0">
+              <a:buNone/>
+            </a:pPr>
+            <a:endParaRPr lang="es-ES" sz="1600" b="1" dirty="0"/>
+          </a:p>
+          <a:p>
+            <a:pPr marL="0" indent="0">
+              <a:buNone/>
+            </a:pPr>
+            <a:r>
+              <a:rPr lang="es-ES" sz="1600" b="1" dirty="0"/>
+              <a:t>Posible análisis:</a:t>
+            </a:r>
+          </a:p>
+          <a:p>
+            <a:pPr marL="0" indent="0">
+              <a:buNone/>
+            </a:pPr>
+            <a:endParaRPr lang="es-ES" sz="1600" b="1" dirty="0"/>
+          </a:p>
+          <a:p>
+            <a:r>
+              <a:rPr lang="es-ES" sz="1600" dirty="0"/>
+              <a:t>Se puede fundamentar en métricas de centralidad, cuales son los artículos sobre los que se asienta la wiki.</a:t>
+            </a:r>
+          </a:p>
+          <a:p>
+            <a:r>
+              <a:rPr lang="es-ES" sz="1600" dirty="0"/>
+              <a:t>Si se hace para la Wikipedia se puede comparar lo central que es un artículo en la red con su calidad (</a:t>
+            </a:r>
+            <a:r>
+              <a:rPr lang="es-ES" sz="1600" dirty="0" err="1"/>
+              <a:t>Stub</a:t>
+            </a:r>
+            <a:r>
+              <a:rPr lang="es-ES" sz="1600" dirty="0"/>
+              <a:t>-FA).</a:t>
+            </a:r>
+          </a:p>
+          <a:p>
+            <a:r>
+              <a:rPr lang="es-ES" sz="1600" dirty="0"/>
+              <a:t>Un análisis de clústeres podría mostrar cuales son los artículos más editados por una comunidad de usuarios.</a:t>
+            </a:r>
+          </a:p>
+          <a:p>
+            <a:endParaRPr lang="es-ES" sz="1600" dirty="0"/>
+          </a:p>
+          <a:p>
+            <a:pPr marL="0" indent="0">
+              <a:buNone/>
+            </a:pPr>
+            <a:endParaRPr lang="es-ES" sz="1600" dirty="0"/>
+          </a:p>
+        </p:txBody>
+      </p:sp>
+    </p:spTree>
+    <p:extLst>
+      <p:ext uri="{BB962C8B-B14F-4D97-AF65-F5344CB8AC3E}">
+        <p14:creationId xmlns:p14="http://schemas.microsoft.com/office/powerpoint/2010/main" val="2199405347"/>
+      </p:ext>
+    </p:extLst>
+  </p:cSld>
+  <p:clrMapOvr>
+    <a:masterClrMapping/>
+  </p:clrMapOvr>
+  <mc:AlternateContent xmlns:mc="http://schemas.openxmlformats.org/markup-compatibility/2006" xmlns:p14="http://schemas.microsoft.com/office/powerpoint/2010/main">
+    <mc:Choice Requires="p14">
+      <p:transition spd="med" p14:dur="700">
+        <p:fade/>
+      </p:transition>
+    </mc:Choice>
+    <mc:Fallback xmlns="">
+      <p:transition spd="med">
+        <p:fade/>
+      </p:transition>
+    </mc:Fallback>
+  </mc:AlternateContent>
+</p:sld>
+</file>
+
+<file path=ppt/slides/slide7.xml><?xml version="1.0" encoding="utf-8"?>
+<p:sld xmlns:a="http://schemas.openxmlformats.org/drawingml/2006/main" xmlns:r="http://schemas.openxmlformats.org/officeDocument/2006/relationships" xmlns:p="http://schemas.openxmlformats.org/presentationml/2006/main">
+  <p:cSld>
+    <p:spTree>
+      <p:nvGrpSpPr>
+        <p:cNvPr id="1" name=""/>
+        <p:cNvGrpSpPr/>
+        <p:nvPr/>
+      </p:nvGrpSpPr>
+      <p:grpSpPr>
+        <a:xfrm>
+          <a:off x="0" y="0"/>
+          <a:ext cx="0" cy="0"/>
+          <a:chOff x="0" y="0"/>
+          <a:chExt cx="0" cy="0"/>
+        </a:xfrm>
+      </p:grpSpPr>
+      <p:sp>
+        <p:nvSpPr>
+          <p:cNvPr id="2" name="Título 1"/>
+          <p:cNvSpPr>
+            <a:spLocks noGrp="1"/>
+          </p:cNvSpPr>
+          <p:nvPr>
+            <p:ph type="title"/>
+          </p:nvPr>
+        </p:nvSpPr>
+        <p:spPr/>
+        <p:txBody>
+          <a:bodyPr rtlCol="0">
+            <a:normAutofit/>
+          </a:bodyPr>
+          <a:lstStyle/>
+          <a:p>
+            <a:pPr rtl="0"/>
+            <a:r>
+              <a:rPr lang="es-ES" sz="2800" dirty="0"/>
+              <a:t>Red 3. Con Taxonomía (es una idea pelegrina)</a:t>
+            </a:r>
+          </a:p>
+        </p:txBody>
+      </p:sp>
+      <p:sp>
+        <p:nvSpPr>
+          <p:cNvPr id="3" name="Marcador de posición de contenido 13">
+            <a:extLst>
+              <a:ext uri="{FF2B5EF4-FFF2-40B4-BE49-F238E27FC236}">
+                <a16:creationId xmlns:a16="http://schemas.microsoft.com/office/drawing/2014/main" id="{36C76092-4EB3-4A65-97D3-371E9ABA090D}"/>
+              </a:ext>
+            </a:extLst>
+          </p:cNvPr>
+          <p:cNvSpPr txBox="1">
+            <a:spLocks/>
+          </p:cNvSpPr>
+          <p:nvPr/>
+        </p:nvSpPr>
+        <p:spPr>
+          <a:xfrm>
+            <a:off x="1593436" y="1600200"/>
+            <a:ext cx="9782801" cy="4572000"/>
+          </a:xfrm>
+          <a:prstGeom prst="rect">
+            <a:avLst/>
+          </a:prstGeom>
+        </p:spPr>
+        <p:txBody>
+          <a:bodyPr rtlCol="0">
+            <a:normAutofit/>
+          </a:bodyPr>
+          <a:lstStyle>
+            <a:lvl1pPr marL="246888" indent="-246888" algn="l" defTabSz="914400" rtl="0" eaLnBrk="1" latinLnBrk="0" hangingPunct="1">
+              <a:lnSpc>
+                <a:spcPct val="90000"/>
+              </a:lnSpc>
+              <a:spcBef>
+                <a:spcPts val="1400"/>
+              </a:spcBef>
+              <a:buFont typeface="Euphemia" pitchFamily="34" charset="0"/>
+              <a:buChar char="›"/>
+              <a:defRPr sz="2800" kern="1200">
+                <a:solidFill>
+                  <a:schemeClr val="tx1"/>
+                </a:solidFill>
+                <a:latin typeface="+mn-lt"/>
+                <a:ea typeface="+mn-ea"/>
+                <a:cs typeface="+mn-cs"/>
+              </a:defRPr>
+            </a:lvl1pPr>
+            <a:lvl2pPr marL="612648" indent="-246888" algn="l" defTabSz="914400" rtl="0" eaLnBrk="1" latinLnBrk="0" hangingPunct="1">
+              <a:lnSpc>
+                <a:spcPct val="90000"/>
+              </a:lnSpc>
+              <a:spcBef>
+                <a:spcPts val="600"/>
+              </a:spcBef>
+              <a:buFont typeface="Euphemia" pitchFamily="34" charset="0"/>
+              <a:buChar char="–"/>
+              <a:defRPr sz="2400" kern="1200">
+                <a:solidFill>
+                  <a:schemeClr val="tx1"/>
+                </a:solidFill>
+                <a:latin typeface="+mn-lt"/>
+                <a:ea typeface="+mn-ea"/>
+                <a:cs typeface="+mn-cs"/>
+              </a:defRPr>
+            </a:lvl2pPr>
+            <a:lvl3pPr marL="978408" indent="-246888" algn="l" defTabSz="914400" rtl="0" eaLnBrk="1" latinLnBrk="0" hangingPunct="1">
+              <a:lnSpc>
+                <a:spcPct val="90000"/>
+              </a:lnSpc>
+              <a:spcBef>
+                <a:spcPts val="600"/>
+              </a:spcBef>
+              <a:buFont typeface="Euphemia" pitchFamily="34" charset="0"/>
+              <a:buChar char="›"/>
+              <a:defRPr sz="2000" kern="1200">
+                <a:solidFill>
+                  <a:schemeClr val="tx1"/>
+                </a:solidFill>
+                <a:latin typeface="+mn-lt"/>
+                <a:ea typeface="+mn-ea"/>
+                <a:cs typeface="+mn-cs"/>
+              </a:defRPr>
+            </a:lvl3pPr>
+            <a:lvl4pPr marL="1344168" indent="-246888" algn="l" defTabSz="914400" rtl="0" eaLnBrk="1" latinLnBrk="0" hangingPunct="1">
+              <a:lnSpc>
+                <a:spcPct val="90000"/>
+              </a:lnSpc>
+              <a:spcBef>
+                <a:spcPts val="600"/>
+              </a:spcBef>
+              <a:buFont typeface="Arial" pitchFamily="34" charset="0"/>
+              <a:buChar char="–"/>
+              <a:defRPr sz="1800" kern="1200">
+                <a:solidFill>
+                  <a:schemeClr val="tx1"/>
+                </a:solidFill>
+                <a:latin typeface="+mn-lt"/>
+                <a:ea typeface="+mn-ea"/>
+                <a:cs typeface="+mn-cs"/>
+              </a:defRPr>
+            </a:lvl4pPr>
+            <a:lvl5pPr marL="1709928" indent="-246888" algn="l" defTabSz="914400" rtl="0" eaLnBrk="1" latinLnBrk="0" hangingPunct="1">
+              <a:lnSpc>
+                <a:spcPct val="90000"/>
+              </a:lnSpc>
+              <a:spcBef>
+                <a:spcPts val="600"/>
+              </a:spcBef>
+              <a:buFont typeface="Euphemia" pitchFamily="34" charset="0"/>
+              <a:buChar char="›"/>
+              <a:defRPr sz="1800" kern="1200">
+                <a:solidFill>
+                  <a:schemeClr val="tx1"/>
+                </a:solidFill>
+                <a:latin typeface="+mn-lt"/>
+                <a:ea typeface="+mn-ea"/>
+                <a:cs typeface="+mn-cs"/>
+              </a:defRPr>
+            </a:lvl5pPr>
+            <a:lvl6pPr marL="2075688" indent="-246888" algn="l" defTabSz="914400" rtl="0" eaLnBrk="1" latinLnBrk="0" hangingPunct="1">
+              <a:lnSpc>
+                <a:spcPct val="90000"/>
+              </a:lnSpc>
+              <a:spcBef>
+                <a:spcPts val="600"/>
+              </a:spcBef>
+              <a:buFont typeface="Euphemia" pitchFamily="34" charset="0"/>
+              <a:buChar char="–"/>
+              <a:defRPr sz="1800" kern="1200">
+                <a:solidFill>
+                  <a:schemeClr val="tx1"/>
+                </a:solidFill>
+                <a:latin typeface="+mn-lt"/>
+                <a:ea typeface="+mn-ea"/>
+                <a:cs typeface="+mn-cs"/>
+              </a:defRPr>
+            </a:lvl6pPr>
+            <a:lvl7pPr marL="2441448" indent="-246888" algn="l" defTabSz="914400" rtl="0" eaLnBrk="1" latinLnBrk="0" hangingPunct="1">
+              <a:lnSpc>
+                <a:spcPct val="90000"/>
+              </a:lnSpc>
+              <a:spcBef>
+                <a:spcPts val="600"/>
+              </a:spcBef>
+              <a:buFont typeface="Euphemia" pitchFamily="34" charset="0"/>
+              <a:buChar char="›"/>
+              <a:defRPr sz="1800" kern="1200">
+                <a:solidFill>
+                  <a:schemeClr val="tx1"/>
+                </a:solidFill>
+                <a:latin typeface="+mn-lt"/>
+                <a:ea typeface="+mn-ea"/>
+                <a:cs typeface="+mn-cs"/>
+              </a:defRPr>
+            </a:lvl7pPr>
+            <a:lvl8pPr marL="2807208" indent="-246888" algn="l" defTabSz="914400" rtl="0" eaLnBrk="1" latinLnBrk="0" hangingPunct="1">
+              <a:lnSpc>
+                <a:spcPct val="90000"/>
+              </a:lnSpc>
+              <a:spcBef>
+                <a:spcPts val="600"/>
+              </a:spcBef>
+              <a:buFont typeface="Euphemia" pitchFamily="34" charset="0"/>
+              <a:buChar char="–"/>
+              <a:defRPr sz="1800" kern="1200" baseline="0">
+                <a:solidFill>
+                  <a:schemeClr val="tx1"/>
+                </a:solidFill>
+                <a:latin typeface="+mn-lt"/>
+                <a:ea typeface="+mn-ea"/>
+                <a:cs typeface="+mn-cs"/>
+              </a:defRPr>
+            </a:lvl8pPr>
+            <a:lvl9pPr marL="3172968" indent="-246888" algn="l" defTabSz="914400" rtl="0" eaLnBrk="1" latinLnBrk="0" hangingPunct="1">
+              <a:lnSpc>
+                <a:spcPct val="90000"/>
+              </a:lnSpc>
+              <a:spcBef>
+                <a:spcPts val="600"/>
+              </a:spcBef>
+              <a:buFont typeface="Euphemia" pitchFamily="34" charset="0"/>
+              <a:buChar char="›"/>
+              <a:defRPr sz="1800" kern="1200" baseline="0">
+                <a:solidFill>
+                  <a:schemeClr val="tx1"/>
+                </a:solidFill>
+                <a:latin typeface="+mn-lt"/>
+                <a:ea typeface="+mn-ea"/>
+                <a:cs typeface="+mn-cs"/>
+              </a:defRPr>
+            </a:lvl9pPr>
+          </a:lstStyle>
+          <a:p>
+            <a:pPr marL="0" indent="0">
+              <a:buNone/>
+            </a:pPr>
+            <a:r>
+              <a:rPr lang="es-ES" sz="1600" b="1" dirty="0"/>
+              <a:t>Características:</a:t>
+            </a:r>
+          </a:p>
+          <a:p>
+            <a:r>
+              <a:rPr lang="es-ES" sz="1600" dirty="0"/>
+              <a:t>Nodos: tuplas usuario, tipo de edición</a:t>
+            </a:r>
+          </a:p>
+          <a:p>
+            <a:r>
+              <a:rPr lang="es-ES" sz="1600" dirty="0"/>
+              <a:t>Aristas: dos usuarios han editado el mismo artículo, y el tipo de edición pertenece al mismo grupo de edición (superficie, contenido, políticas de Wikipedia), </a:t>
+            </a:r>
+            <a:r>
+              <a:rPr lang="es-ES" sz="1600" b="1" dirty="0"/>
+              <a:t>(Son dos condiciones para formar la arista).</a:t>
+            </a:r>
+          </a:p>
+          <a:p>
+            <a:pPr marL="0" indent="0">
+              <a:buNone/>
+            </a:pPr>
+            <a:r>
+              <a:rPr lang="es-ES" sz="1600" b="1" dirty="0"/>
+              <a:t>Pros:</a:t>
+            </a:r>
+          </a:p>
+          <a:p>
+            <a:r>
+              <a:rPr lang="es-ES" sz="1600" dirty="0"/>
+              <a:t>Añade información de las ediciones a la red</a:t>
+            </a:r>
+          </a:p>
+          <a:p>
+            <a:r>
+              <a:rPr lang="es-ES" sz="1600" dirty="0"/>
+              <a:t>No solo sabríamos que usuario es más importante, sino también que rol de este lo es.</a:t>
+            </a:r>
+          </a:p>
+          <a:p>
+            <a:endParaRPr lang="es-ES" sz="1600" dirty="0"/>
+          </a:p>
+          <a:p>
+            <a:pPr marL="0" indent="0">
+              <a:buNone/>
+            </a:pPr>
+            <a:r>
+              <a:rPr lang="es-ES" sz="1600" b="1" dirty="0"/>
               <a:t>Contras:</a:t>
             </a:r>
           </a:p>
@@ -9313,7 +10153,7 @@
           <a:p>
             <a:r>
               <a:rPr lang="es-ES" sz="1600" dirty="0"/>
-              <a:t>Aumenta el tamaño de la red en un factor igual al número de ediciones</a:t>
+              <a:t>Aumenta el tamaño de la red, indispensable filtrar la red.</a:t>
             </a:r>
           </a:p>
         </p:txBody>

</xml_diff>